<commit_message>
added better envolpe stuff, why!
</commit_message>
<xml_diff>
--- a/Progress-Check/Concept_Sketch_Pres.pptx
+++ b/Progress-Check/Concept_Sketch_Pres.pptx
@@ -7,9 +7,8 @@
   <p:sldIdLst>
     <p:sldId id="256" r:id="rId2"/>
     <p:sldId id="257" r:id="rId3"/>
-    <p:sldId id="265" r:id="rId4"/>
-    <p:sldId id="266" r:id="rId5"/>
-    <p:sldId id="263" r:id="rId6"/>
+    <p:sldId id="266" r:id="rId4"/>
+    <p:sldId id="263" r:id="rId5"/>
   </p:sldIdLst>
   <p:sldSz cx="12192000" cy="6858000"/>
   <p:notesSz cx="6858000" cy="9144000"/>
@@ -312,7 +311,7 @@
           <a:p>
             <a:fld id="{FCABAC5C-AB45-4E82-BA48-750F3F683C3E}" type="datetimeFigureOut">
               <a:rPr lang="en-US" smtClean="0"/>
-              <a:t>3/31/2021</a:t>
+              <a:t>4/25/2021</a:t>
             </a:fld>
             <a:endParaRPr lang="en-US"/>
           </a:p>
@@ -536,7 +535,7 @@
           <a:p>
             <a:fld id="{FCABAC5C-AB45-4E82-BA48-750F3F683C3E}" type="datetimeFigureOut">
               <a:rPr lang="en-US" smtClean="0"/>
-              <a:t>3/31/2021</a:t>
+              <a:t>4/25/2021</a:t>
             </a:fld>
             <a:endParaRPr lang="en-US"/>
           </a:p>
@@ -716,7 +715,7 @@
           <a:p>
             <a:fld id="{FCABAC5C-AB45-4E82-BA48-750F3F683C3E}" type="datetimeFigureOut">
               <a:rPr lang="en-US" smtClean="0"/>
-              <a:t>3/31/2021</a:t>
+              <a:t>4/25/2021</a:t>
             </a:fld>
             <a:endParaRPr lang="en-US"/>
           </a:p>
@@ -886,7 +885,7 @@
           <a:p>
             <a:fld id="{FCABAC5C-AB45-4E82-BA48-750F3F683C3E}" type="datetimeFigureOut">
               <a:rPr lang="en-US" smtClean="0"/>
-              <a:t>3/31/2021</a:t>
+              <a:t>4/25/2021</a:t>
             </a:fld>
             <a:endParaRPr lang="en-US"/>
           </a:p>
@@ -1177,7 +1176,7 @@
           <a:p>
             <a:fld id="{FCABAC5C-AB45-4E82-BA48-750F3F683C3E}" type="datetimeFigureOut">
               <a:rPr lang="en-US" smtClean="0"/>
-              <a:t>3/31/2021</a:t>
+              <a:t>4/25/2021</a:t>
             </a:fld>
             <a:endParaRPr lang="en-US"/>
           </a:p>
@@ -1503,7 +1502,7 @@
           <a:p>
             <a:fld id="{FCABAC5C-AB45-4E82-BA48-750F3F683C3E}" type="datetimeFigureOut">
               <a:rPr lang="en-US" smtClean="0"/>
-              <a:t>3/31/2021</a:t>
+              <a:t>4/25/2021</a:t>
             </a:fld>
             <a:endParaRPr lang="en-US"/>
           </a:p>
@@ -1915,7 +1914,7 @@
           <a:p>
             <a:fld id="{FCABAC5C-AB45-4E82-BA48-750F3F683C3E}" type="datetimeFigureOut">
               <a:rPr lang="en-US" smtClean="0"/>
-              <a:t>3/31/2021</a:t>
+              <a:t>4/25/2021</a:t>
             </a:fld>
             <a:endParaRPr lang="en-US"/>
           </a:p>
@@ -2033,7 +2032,7 @@
           <a:p>
             <a:fld id="{FCABAC5C-AB45-4E82-BA48-750F3F683C3E}" type="datetimeFigureOut">
               <a:rPr lang="en-US" smtClean="0"/>
-              <a:t>3/31/2021</a:t>
+              <a:t>4/25/2021</a:t>
             </a:fld>
             <a:endParaRPr lang="en-US"/>
           </a:p>
@@ -2128,7 +2127,7 @@
           <a:p>
             <a:fld id="{FCABAC5C-AB45-4E82-BA48-750F3F683C3E}" type="datetimeFigureOut">
               <a:rPr lang="en-US" smtClean="0"/>
-              <a:t>3/31/2021</a:t>
+              <a:t>4/25/2021</a:t>
             </a:fld>
             <a:endParaRPr lang="en-US"/>
           </a:p>
@@ -2415,7 +2414,7 @@
           <a:p>
             <a:fld id="{FCABAC5C-AB45-4E82-BA48-750F3F683C3E}" type="datetimeFigureOut">
               <a:rPr lang="en-US" smtClean="0"/>
-              <a:t>3/31/2021</a:t>
+              <a:t>4/25/2021</a:t>
             </a:fld>
             <a:endParaRPr lang="en-US"/>
           </a:p>
@@ -2692,7 +2691,7 @@
           <a:p>
             <a:fld id="{FCABAC5C-AB45-4E82-BA48-750F3F683C3E}" type="datetimeFigureOut">
               <a:rPr lang="en-US" smtClean="0"/>
-              <a:t>3/31/2021</a:t>
+              <a:t>4/25/2021</a:t>
             </a:fld>
             <a:endParaRPr lang="en-US"/>
           </a:p>
@@ -2943,7 +2942,7 @@
           <a:p>
             <a:fld id="{FCABAC5C-AB45-4E82-BA48-750F3F683C3E}" type="datetimeFigureOut">
               <a:rPr lang="en-US" smtClean="0"/>
-              <a:t>3/31/2021</a:t>
+              <a:t>4/25/2021</a:t>
             </a:fld>
             <a:endParaRPr lang="en-US"/>
           </a:p>
@@ -3523,8 +3522,13 @@
           <a:p>
             <a:r>
               <a:rPr lang="en-US" sz="6000" dirty="0"/>
-              <a:t>Pure Data Synthesizer – Mid Progress Check</a:t>
-            </a:r>
+              <a:t>Pure Data Synthesizer – </a:t>
+            </a:r>
+            <a:r>
+              <a:rPr lang="en-US" sz="6000"/>
+              <a:t>Progress Check 2</a:t>
+            </a:r>
+            <a:endParaRPr lang="en-US" sz="6000" dirty="0"/>
           </a:p>
         </p:txBody>
       </p:sp>
@@ -3896,55 +3900,51 @@
         </p:spPr>
         <p:txBody>
           <a:bodyPr>
-            <a:normAutofit fontScale="85000" lnSpcReduction="20000"/>
+            <a:normAutofit/>
           </a:bodyPr>
           <a:lstStyle/>
           <a:p>
             <a:r>
               <a:rPr lang="en-US" dirty="0"/>
-              <a:t>Build a synthesizer that users can use to create music.</a:t>
-            </a:r>
-          </a:p>
-          <a:p>
+              <a:t>Reduced Scoped</a:t>
+            </a:r>
+          </a:p>
+          <a:p>
+            <a:pPr lvl="1"/>
             <a:r>
               <a:rPr lang="en-US" dirty="0"/>
-              <a:t>Take computer hardware and interfaces that normal people have and turn into a musical instrument that people can use to express themselves.</a:t>
+              <a:t>Basic Synthesizer with (hopefully) vocoder support.</a:t>
             </a:r>
           </a:p>
           <a:p>
             <a:r>
               <a:rPr lang="en-US" dirty="0"/>
-              <a:t>Model off traditional synthesizers to provide the same capabilities. </a:t>
+              <a:t>Synthesizer has 4 oscillators (Sin, Sawtooth, Triangle, and Square).</a:t>
             </a:r>
           </a:p>
           <a:p>
             <a:r>
               <a:rPr lang="en-US" dirty="0"/>
-              <a:t>Allow users to customize the sounds like traditional synthesizers.   </a:t>
+              <a:t>Synthesizer has Filter support. (low pass, high pass, bandpass, band reject (notch)).</a:t>
             </a:r>
           </a:p>
           <a:p>
             <a:r>
               <a:rPr lang="en-US" dirty="0"/>
-              <a:t>Synthesizer will also support a vocoder to allow more expression. </a:t>
+              <a:t>Synthesizer has Envelope support. (Attack, Decay, Sustain, and Release).</a:t>
             </a:r>
           </a:p>
           <a:p>
             <a:r>
               <a:rPr lang="en-US" dirty="0"/>
-              <a:t>Keyboard Synthesizer has limited voices, i.e. a limited amount of keys that can be pressed to produce sound. Currently, the Keyboard Synth has 10 voices, which means that you can press 10 keys at once and get each individual sound. </a:t>
+              <a:t>No longer doing Gate/triggers, Amplifier kind of implemented with volume control.</a:t>
             </a:r>
           </a:p>
           <a:p>
             <a:r>
               <a:rPr lang="en-US" dirty="0"/>
-              <a:t>GUI Interface using Pure Data Patch Cord UI along </a:t>
-            </a:r>
-            <a:r>
-              <a:rPr lang="en-US"/>
-              <a:t>with sliders. </a:t>
-            </a:r>
-            <a:endParaRPr lang="en-US" dirty="0"/>
+              <a:t>No more MIDI support.  </a:t>
+            </a:r>
           </a:p>
         </p:txBody>
       </p:sp>
@@ -3962,210 +3962,6 @@
 </file>
 
 <file path=ppt/slides/slide3.xml><?xml version="1.0" encoding="utf-8"?>
-<p:sld xmlns:a="http://schemas.openxmlformats.org/drawingml/2006/main" xmlns:r="http://schemas.openxmlformats.org/officeDocument/2006/relationships" xmlns:p="http://schemas.openxmlformats.org/presentationml/2006/main">
-  <p:cSld>
-    <p:spTree>
-      <p:nvGrpSpPr>
-        <p:cNvPr id="1" name=""/>
-        <p:cNvGrpSpPr/>
-        <p:nvPr/>
-      </p:nvGrpSpPr>
-      <p:grpSpPr>
-        <a:xfrm>
-          <a:off x="0" y="0"/>
-          <a:ext cx="0" cy="0"/>
-          <a:chOff x="0" y="0"/>
-          <a:chExt cx="0" cy="0"/>
-        </a:xfrm>
-      </p:grpSpPr>
-      <p:sp>
-        <p:nvSpPr>
-          <p:cNvPr id="2" name="Title 1">
-            <a:extLst>
-              <a:ext uri="{FF2B5EF4-FFF2-40B4-BE49-F238E27FC236}">
-                <a16:creationId xmlns:a16="http://schemas.microsoft.com/office/drawing/2014/main" id="{59364207-A99B-4B81-A513-EED2EF31CF3D}"/>
-              </a:ext>
-            </a:extLst>
-          </p:cNvPr>
-          <p:cNvSpPr>
-            <a:spLocks noGrp="1"/>
-          </p:cNvSpPr>
-          <p:nvPr>
-            <p:ph type="title"/>
-          </p:nvPr>
-        </p:nvSpPr>
-        <p:spPr/>
-        <p:txBody>
-          <a:bodyPr/>
-          <a:lstStyle/>
-          <a:p>
-            <a:r>
-              <a:rPr lang="en-US" dirty="0"/>
-              <a:t>Literature Update</a:t>
-            </a:r>
-          </a:p>
-        </p:txBody>
-      </p:sp>
-      <p:sp>
-        <p:nvSpPr>
-          <p:cNvPr id="3" name="Content Placeholder 2">
-            <a:extLst>
-              <a:ext uri="{FF2B5EF4-FFF2-40B4-BE49-F238E27FC236}">
-                <a16:creationId xmlns:a16="http://schemas.microsoft.com/office/drawing/2014/main" id="{7FC37D1E-532B-4398-9F69-8B34E53D9B15}"/>
-              </a:ext>
-            </a:extLst>
-          </p:cNvPr>
-          <p:cNvSpPr>
-            <a:spLocks noGrp="1"/>
-          </p:cNvSpPr>
-          <p:nvPr>
-            <p:ph idx="1"/>
-          </p:nvPr>
-        </p:nvSpPr>
-        <p:spPr/>
-        <p:txBody>
-          <a:bodyPr/>
-          <a:lstStyle/>
-          <a:p>
-            <a:r>
-              <a:rPr lang="en-US" dirty="0">
-                <a:effectLst/>
-              </a:rPr>
-              <a:t>Article Detailing th</a:t>
-            </a:r>
-            <a:r>
-              <a:rPr lang="en-US" dirty="0"/>
-              <a:t>e Different Wave types that Synthesizers make</a:t>
-            </a:r>
-            <a:endParaRPr lang="en-US" dirty="0">
-              <a:effectLst/>
-            </a:endParaRPr>
-          </a:p>
-          <a:p>
-            <a:pPr lvl="1"/>
-            <a:r>
-              <a:rPr lang="en-US" dirty="0" err="1">
-                <a:effectLst/>
-              </a:rPr>
-              <a:t>Riesterer</a:t>
-            </a:r>
-            <a:r>
-              <a:rPr lang="en-US" dirty="0">
-                <a:effectLst/>
-              </a:rPr>
-              <a:t>, S. (2017, April 22). Synthesis essentials: All about oscillators. Retrieved March 31, 2021, from </a:t>
-            </a:r>
-            <a:r>
-              <a:rPr lang="en-US" dirty="0">
-                <a:effectLst/>
-                <a:hlinkClick r:id="rId2"/>
-              </a:rPr>
-              <a:t>https://ask.audio/articles/synthesis-essentials-all-about-oscillators#:~:text=Sine%2C%20Triangle%2C%20Sawtooth%2C%20and,take%20place%20above%20the%20fundamental</a:t>
-            </a:r>
-            <a:r>
-              <a:rPr lang="en-US" dirty="0">
-                <a:effectLst/>
-              </a:rPr>
-              <a:t>.</a:t>
-            </a:r>
-          </a:p>
-          <a:p>
-            <a:r>
-              <a:rPr lang="en-US" dirty="0"/>
-              <a:t>Online Publication detailing the basics of a Synthesizer going over basic components. </a:t>
-            </a:r>
-          </a:p>
-          <a:p>
-            <a:pPr lvl="1"/>
-            <a:r>
-              <a:rPr lang="en-US" dirty="0">
-                <a:effectLst/>
-              </a:rPr>
-              <a:t>Sievers, B. (2006, November). A young person's guide to the principles of music synthesis. Retrieved March 31, 2021, from </a:t>
-            </a:r>
-            <a:r>
-              <a:rPr lang="en-US" dirty="0">
-                <a:effectLst/>
-                <a:hlinkClick r:id="rId3"/>
-              </a:rPr>
-              <a:t>http://beausievers.com/synth/synthbasics/#conclusion</a:t>
-            </a:r>
-            <a:endParaRPr lang="en-US" dirty="0">
-              <a:effectLst/>
-            </a:endParaRPr>
-          </a:p>
-          <a:p>
-            <a:pPr marL="274320" lvl="1" indent="0">
-              <a:buNone/>
-            </a:pPr>
-            <a:endParaRPr lang="en-US" dirty="0"/>
-          </a:p>
-          <a:p>
-            <a:endParaRPr lang="en-US" dirty="0"/>
-          </a:p>
-        </p:txBody>
-      </p:sp>
-      <p:pic>
-        <p:nvPicPr>
-          <p:cNvPr id="1026" name="Picture 2">
-            <a:extLst>
-              <a:ext uri="{FF2B5EF4-FFF2-40B4-BE49-F238E27FC236}">
-                <a16:creationId xmlns:a16="http://schemas.microsoft.com/office/drawing/2014/main" id="{BF4517A8-01F8-4F79-A944-1AA6A1343B81}"/>
-              </a:ext>
-            </a:extLst>
-          </p:cNvPr>
-          <p:cNvPicPr>
-            <a:picLocks noChangeAspect="1" noChangeArrowheads="1"/>
-          </p:cNvPicPr>
-          <p:nvPr/>
-        </p:nvPicPr>
-        <p:blipFill>
-          <a:blip r:embed="rId4">
-            <a:extLst>
-              <a:ext uri="{28A0092B-C50C-407E-A947-70E740481C1C}">
-                <a14:useLocalDpi xmlns:a14="http://schemas.microsoft.com/office/drawing/2010/main" val="0"/>
-              </a:ext>
-            </a:extLst>
-          </a:blip>
-          <a:srcRect/>
-          <a:stretch>
-            <a:fillRect/>
-          </a:stretch>
-        </p:blipFill>
-        <p:spPr bwMode="auto">
-          <a:xfrm>
-            <a:off x="3293705" y="4673569"/>
-            <a:ext cx="4304523" cy="1915257"/>
-          </a:xfrm>
-          <a:prstGeom prst="rect">
-            <a:avLst/>
-          </a:prstGeom>
-          <a:noFill/>
-          <a:extLst>
-            <a:ext uri="{909E8E84-426E-40DD-AFC4-6F175D3DCCD1}">
-              <a14:hiddenFill xmlns:a14="http://schemas.microsoft.com/office/drawing/2010/main">
-                <a:solidFill>
-                  <a:srgbClr val="FFFFFF"/>
-                </a:solidFill>
-              </a14:hiddenFill>
-            </a:ext>
-          </a:extLst>
-        </p:spPr>
-      </p:pic>
-    </p:spTree>
-    <p:extLst>
-      <p:ext uri="{BB962C8B-B14F-4D97-AF65-F5344CB8AC3E}">
-        <p14:creationId xmlns:p14="http://schemas.microsoft.com/office/powerpoint/2010/main" val="940273955"/>
-      </p:ext>
-    </p:extLst>
-  </p:cSld>
-  <p:clrMapOvr>
-    <a:masterClrMapping/>
-  </p:clrMapOvr>
-</p:sld>
-</file>
-
-<file path=ppt/slides/slide4.xml><?xml version="1.0" encoding="utf-8"?>
 <p:sld xmlns:a="http://schemas.openxmlformats.org/drawingml/2006/main" xmlns:r="http://schemas.openxmlformats.org/officeDocument/2006/relationships" xmlns:p="http://schemas.openxmlformats.org/presentationml/2006/main">
   <p:cSld>
     <p:bg>
@@ -4254,7 +4050,7 @@
           <a:lstStyle/>
           <a:p>
             <a:r>
-              <a:rPr lang="en-US" sz="1600"/>
+              <a:rPr lang="en-US" sz="1600" dirty="0"/>
               <a:t>Completed</a:t>
             </a:r>
           </a:p>
@@ -4269,12 +4065,26 @@
             <a:pPr lvl="1"/>
             <a:r>
               <a:rPr lang="en-US" dirty="0"/>
-              <a:t>Basic Oscillator (Sine)</a:t>
-            </a:r>
-          </a:p>
-          <a:p>
-            <a:r>
-              <a:rPr lang="en-US" sz="1600"/>
+              <a:t>Four Oscillator ( Sin, Sawtooth, Triangle, Square)</a:t>
+            </a:r>
+          </a:p>
+          <a:p>
+            <a:pPr lvl="1"/>
+            <a:r>
+              <a:rPr lang="en-US" dirty="0"/>
+              <a:t>Filter and Envelope</a:t>
+            </a:r>
+          </a:p>
+          <a:p>
+            <a:pPr lvl="1"/>
+            <a:r>
+              <a:rPr lang="en-US" dirty="0"/>
+              <a:t>Amplifier (volume) </a:t>
+            </a:r>
+          </a:p>
+          <a:p>
+            <a:r>
+              <a:rPr lang="en-US" sz="1600" dirty="0"/>
               <a:t>Upcoming</a:t>
             </a:r>
           </a:p>
@@ -4282,35 +4092,7 @@
             <a:pPr lvl="1"/>
             <a:r>
               <a:rPr lang="en-US" dirty="0"/>
-              <a:t>(Next) Implement other types of Oscillator (Triangle, Sawtooth, Square)</a:t>
-            </a:r>
-          </a:p>
-          <a:p>
-            <a:pPr lvl="1"/>
-            <a:r>
-              <a:rPr lang="en-US" dirty="0"/>
-              <a:t>Amplifier and Filter Components</a:t>
-            </a:r>
-          </a:p>
-          <a:p>
-            <a:pPr lvl="1"/>
-            <a:r>
-              <a:rPr lang="en-US" dirty="0"/>
-              <a:t>Envelope and Gate/Triggers Components</a:t>
-            </a:r>
-          </a:p>
-          <a:p>
-            <a:pPr lvl="1"/>
-            <a:r>
-              <a:rPr lang="en-US" dirty="0"/>
-              <a:t>Vocoder </a:t>
-            </a:r>
-          </a:p>
-          <a:p>
-            <a:pPr lvl="1"/>
-            <a:r>
-              <a:rPr lang="en-US" dirty="0"/>
-              <a:t>MIDI Support </a:t>
+              <a:t>Vocoder and External Audio support.</a:t>
             </a:r>
           </a:p>
           <a:p>
@@ -4321,7 +4103,7 @@
       </p:sp>
       <p:sp>
         <p:nvSpPr>
-          <p:cNvPr id="14" name="Rectangle 13">
+          <p:cNvPr id="19" name="Rectangle 18">
             <a:extLst>
               <a:ext uri="{FF2B5EF4-FFF2-40B4-BE49-F238E27FC236}">
                 <a16:creationId xmlns:a16="http://schemas.microsoft.com/office/drawing/2014/main" id="{7F1E7AFF-0BDE-41B0-A9C8-A3E0E9DED049}"/>
@@ -4384,10 +4166,10 @@
       </p:sp>
       <p:pic>
         <p:nvPicPr>
-          <p:cNvPr id="9" name="Picture 8">
+          <p:cNvPr id="4" name="Picture 3">
             <a:extLst>
               <a:ext uri="{FF2B5EF4-FFF2-40B4-BE49-F238E27FC236}">
-                <a16:creationId xmlns:a16="http://schemas.microsoft.com/office/drawing/2014/main" id="{D262DC5A-80E9-48BE-9D63-817601726D97}"/>
+                <a16:creationId xmlns:a16="http://schemas.microsoft.com/office/drawing/2014/main" id="{7117F4CD-904C-49B7-B1D6-05739EAD3595}"/>
               </a:ext>
             </a:extLst>
           </p:cNvPr>
@@ -4404,8 +4186,8 @@
         </p:blipFill>
         <p:spPr>
           <a:xfrm>
-            <a:off x="4208016" y="2127379"/>
-            <a:ext cx="7083652" cy="2603241"/>
+            <a:off x="4654296" y="1448906"/>
+            <a:ext cx="6155736" cy="3970449"/>
           </a:xfrm>
           <a:prstGeom prst="rect">
             <a:avLst/>
@@ -4425,7 +4207,7 @@
 </p:sld>
 </file>
 
-<file path=ppt/slides/slide5.xml><?xml version="1.0" encoding="utf-8"?>
+<file path=ppt/slides/slide4.xml><?xml version="1.0" encoding="utf-8"?>
 <p:sld xmlns:a="http://schemas.openxmlformats.org/drawingml/2006/main" xmlns:r="http://schemas.openxmlformats.org/officeDocument/2006/relationships" xmlns:p="http://schemas.openxmlformats.org/presentationml/2006/main">
   <p:cSld>
     <p:bg>

</xml_diff>

<commit_message>
added final stuff blahj
</commit_message>
<xml_diff>
--- a/Progress-Check/Concept_Sketch_Pres.pptx
+++ b/Progress-Check/Concept_Sketch_Pres.pptx
@@ -311,7 +311,7 @@
           <a:p>
             <a:fld id="{FCABAC5C-AB45-4E82-BA48-750F3F683C3E}" type="datetimeFigureOut">
               <a:rPr lang="en-US" smtClean="0"/>
-              <a:t>4/25/2021</a:t>
+              <a:t>4/28/2021</a:t>
             </a:fld>
             <a:endParaRPr lang="en-US"/>
           </a:p>
@@ -535,7 +535,7 @@
           <a:p>
             <a:fld id="{FCABAC5C-AB45-4E82-BA48-750F3F683C3E}" type="datetimeFigureOut">
               <a:rPr lang="en-US" smtClean="0"/>
-              <a:t>4/25/2021</a:t>
+              <a:t>4/28/2021</a:t>
             </a:fld>
             <a:endParaRPr lang="en-US"/>
           </a:p>
@@ -715,7 +715,7 @@
           <a:p>
             <a:fld id="{FCABAC5C-AB45-4E82-BA48-750F3F683C3E}" type="datetimeFigureOut">
               <a:rPr lang="en-US" smtClean="0"/>
-              <a:t>4/25/2021</a:t>
+              <a:t>4/28/2021</a:t>
             </a:fld>
             <a:endParaRPr lang="en-US"/>
           </a:p>
@@ -885,7 +885,7 @@
           <a:p>
             <a:fld id="{FCABAC5C-AB45-4E82-BA48-750F3F683C3E}" type="datetimeFigureOut">
               <a:rPr lang="en-US" smtClean="0"/>
-              <a:t>4/25/2021</a:t>
+              <a:t>4/28/2021</a:t>
             </a:fld>
             <a:endParaRPr lang="en-US"/>
           </a:p>
@@ -1176,7 +1176,7 @@
           <a:p>
             <a:fld id="{FCABAC5C-AB45-4E82-BA48-750F3F683C3E}" type="datetimeFigureOut">
               <a:rPr lang="en-US" smtClean="0"/>
-              <a:t>4/25/2021</a:t>
+              <a:t>4/28/2021</a:t>
             </a:fld>
             <a:endParaRPr lang="en-US"/>
           </a:p>
@@ -1502,7 +1502,7 @@
           <a:p>
             <a:fld id="{FCABAC5C-AB45-4E82-BA48-750F3F683C3E}" type="datetimeFigureOut">
               <a:rPr lang="en-US" smtClean="0"/>
-              <a:t>4/25/2021</a:t>
+              <a:t>4/28/2021</a:t>
             </a:fld>
             <a:endParaRPr lang="en-US"/>
           </a:p>
@@ -1914,7 +1914,7 @@
           <a:p>
             <a:fld id="{FCABAC5C-AB45-4E82-BA48-750F3F683C3E}" type="datetimeFigureOut">
               <a:rPr lang="en-US" smtClean="0"/>
-              <a:t>4/25/2021</a:t>
+              <a:t>4/28/2021</a:t>
             </a:fld>
             <a:endParaRPr lang="en-US"/>
           </a:p>
@@ -2032,7 +2032,7 @@
           <a:p>
             <a:fld id="{FCABAC5C-AB45-4E82-BA48-750F3F683C3E}" type="datetimeFigureOut">
               <a:rPr lang="en-US" smtClean="0"/>
-              <a:t>4/25/2021</a:t>
+              <a:t>4/28/2021</a:t>
             </a:fld>
             <a:endParaRPr lang="en-US"/>
           </a:p>
@@ -2127,7 +2127,7 @@
           <a:p>
             <a:fld id="{FCABAC5C-AB45-4E82-BA48-750F3F683C3E}" type="datetimeFigureOut">
               <a:rPr lang="en-US" smtClean="0"/>
-              <a:t>4/25/2021</a:t>
+              <a:t>4/28/2021</a:t>
             </a:fld>
             <a:endParaRPr lang="en-US"/>
           </a:p>
@@ -2414,7 +2414,7 @@
           <a:p>
             <a:fld id="{FCABAC5C-AB45-4E82-BA48-750F3F683C3E}" type="datetimeFigureOut">
               <a:rPr lang="en-US" smtClean="0"/>
-              <a:t>4/25/2021</a:t>
+              <a:t>4/28/2021</a:t>
             </a:fld>
             <a:endParaRPr lang="en-US"/>
           </a:p>
@@ -2691,7 +2691,7 @@
           <a:p>
             <a:fld id="{FCABAC5C-AB45-4E82-BA48-750F3F683C3E}" type="datetimeFigureOut">
               <a:rPr lang="en-US" smtClean="0"/>
-              <a:t>4/25/2021</a:t>
+              <a:t>4/28/2021</a:t>
             </a:fld>
             <a:endParaRPr lang="en-US"/>
           </a:p>
@@ -2942,7 +2942,7 @@
           <a:p>
             <a:fld id="{FCABAC5C-AB45-4E82-BA48-750F3F683C3E}" type="datetimeFigureOut">
               <a:rPr lang="en-US" smtClean="0"/>
-              <a:t>4/25/2021</a:t>
+              <a:t>4/28/2021</a:t>
             </a:fld>
             <a:endParaRPr lang="en-US"/>
           </a:p>
@@ -3919,7 +3919,7 @@
           <a:p>
             <a:r>
               <a:rPr lang="en-US" dirty="0"/>
-              <a:t>Synthesizer has 4 oscillators (Sin, Sawtooth, Triangle, and Square).</a:t>
+              <a:t>Synthesizer has 5 oscillators (Sin, Sawtooth, Triangle, Square, and Custom) with Octave changes.</a:t>
             </a:r>
           </a:p>
           <a:p>
@@ -4065,8 +4065,13 @@
             <a:pPr lvl="1"/>
             <a:r>
               <a:rPr lang="en-US" dirty="0"/>
-              <a:t>Four Oscillator ( Sin, Sawtooth, Triangle, Square)</a:t>
-            </a:r>
+              <a:t>Five Oscillator ( Sin, Sawtooth, Triangle, Square</a:t>
+            </a:r>
+            <a:r>
+              <a:rPr lang="en-US"/>
+              <a:t>, Custom)</a:t>
+            </a:r>
+            <a:endParaRPr lang="en-US" dirty="0"/>
           </a:p>
           <a:p>
             <a:pPr lvl="1"/>

</xml_diff>